<commit_message>
New files in guidelines added
</commit_message>
<xml_diff>
--- a/ppt/principle2.pptx
+++ b/ppt/principle2.pptx
@@ -14,8 +14,8 @@
     <p:sldId id="259" r:id="rId2"/>
     <p:sldId id="307" r:id="rId3"/>
     <p:sldId id="308" r:id="rId4"/>
-    <p:sldId id="310" r:id="rId5"/>
-    <p:sldId id="309" r:id="rId6"/>
+    <p:sldId id="309" r:id="rId5"/>
+    <p:sldId id="310" r:id="rId6"/>
     <p:sldId id="311" r:id="rId7"/>
   </p:sldIdLst>
   <p:sldSz cx="9144000" cy="6858000" type="screen4x3"/>
@@ -123,8 +123,8 @@
             <p14:sldId id="259"/>
             <p14:sldId id="307"/>
             <p14:sldId id="308"/>
+            <p14:sldId id="309"/>
             <p14:sldId id="310"/>
-            <p14:sldId id="309"/>
             <p14:sldId id="311"/>
           </p14:sldIdLst>
         </p14:section>
@@ -220,7 +220,7 @@
             <a:fld id="{D83FDC75-7F73-4A4A-A77C-09AADF00E0EA}" type="datetimeFigureOut">
               <a:rPr lang="en-US" smtClean="0"/>
               <a:pPr/>
-              <a:t>11/16/2013</a:t>
+              <a:t>11/17/2013</a:t>
             </a:fld>
             <a:endParaRPr lang="en-US" dirty="0"/>
           </a:p>
@@ -388,7 +388,7 @@
             <a:fld id="{48AEF76B-3757-4A0B-AF93-28494465C1DD}" type="datetimeFigureOut">
               <a:rPr lang="en-US" smtClean="0"/>
               <a:pPr/>
-              <a:t>11/16/2013</a:t>
+              <a:t>11/17/2013</a:t>
             </a:fld>
             <a:endParaRPr lang="en-US" dirty="0"/>
           </a:p>
@@ -1245,323 +1245,7 @@
           <a:bodyPr/>
           <a:lstStyle/>
           <a:p>
-            <a:r>
-              <a:rPr lang="en-US" dirty="0" smtClean="0"/>
-              <a:t>2.4.1 </a:t>
-            </a:r>
-            <a:r>
-              <a:rPr lang="en-US" dirty="0" err="1" smtClean="0"/>
-              <a:t>ByPass</a:t>
-            </a:r>
-            <a:r>
-              <a:rPr lang="en-US" baseline="0" dirty="0" smtClean="0"/>
-              <a:t> content : </a:t>
-            </a:r>
-            <a:r>
-              <a:rPr lang="en-US" sz="1200" i="1" kern="1200" dirty="0" smtClean="0">
-                <a:solidFill>
-                  <a:schemeClr val="tx1"/>
-                </a:solidFill>
-                <a:latin typeface="+mn-lt"/>
-                <a:ea typeface="+mn-ea"/>
-                <a:cs typeface="+mn-cs"/>
-              </a:rPr>
-              <a:t>Example 1: An online newspaper</a:t>
-            </a:r>
-          </a:p>
-          <a:p>
-            <a:r>
-              <a:rPr lang="en-US" sz="1200" i="0" kern="1200" dirty="0" smtClean="0">
-                <a:solidFill>
-                  <a:schemeClr val="tx1"/>
-                </a:solidFill>
-                <a:latin typeface="+mn-lt"/>
-                <a:ea typeface="+mn-ea"/>
-                <a:cs typeface="+mn-cs"/>
-              </a:rPr>
-              <a:t>An on-line newspaper contains many sections of information: a search function, a corporate banner, sidebars, minor stories, how to contact the newspaper, etc. The lead story is located in the middle of the page. The first link that the user reaches when tabbing through the page is titled "Skip to Lead Story". Activating the link moves visual focus to the story. Pressing tab again takes the user to the first link in the main story.</a:t>
-            </a:r>
-          </a:p>
-          <a:p>
-            <a:r>
-              <a:rPr lang="en-US" sz="1200" i="1" kern="1200" dirty="0" smtClean="0">
-                <a:solidFill>
-                  <a:schemeClr val="tx1"/>
-                </a:solidFill>
-                <a:latin typeface="+mn-lt"/>
-                <a:ea typeface="+mn-ea"/>
-                <a:cs typeface="+mn-cs"/>
-              </a:rPr>
-              <a:t>Example 2: A "Skip to main content" link</a:t>
-            </a:r>
-          </a:p>
-          <a:p>
-            <a:r>
-              <a:rPr lang="en-US" sz="1200" i="0" kern="1200" dirty="0" smtClean="0">
-                <a:solidFill>
-                  <a:schemeClr val="tx1"/>
-                </a:solidFill>
-                <a:latin typeface="+mn-lt"/>
-                <a:ea typeface="+mn-ea"/>
-                <a:cs typeface="+mn-cs"/>
-              </a:rPr>
-              <a:t>A Web page includes a variety of navigation techniques on each page: a bread crumb trail, a search tool, a site map, and a list of related resources. The first link on the page is titled "Skip to Main Content". A user activates the link to skip over the navigation tools. </a:t>
-            </a:r>
-          </a:p>
-          <a:p>
-            <a:r>
-              <a:rPr lang="en-US" sz="1200" i="0" kern="1200" dirty="0" smtClean="0">
-                <a:solidFill>
-                  <a:schemeClr val="tx1"/>
-                </a:solidFill>
-                <a:latin typeface="+mn-lt"/>
-                <a:ea typeface="+mn-ea"/>
-                <a:cs typeface="+mn-cs"/>
-              </a:rPr>
-              <a:t>A very</a:t>
-            </a:r>
-            <a:r>
-              <a:rPr lang="en-US" sz="1200" i="0" kern="1200" baseline="0" dirty="0" smtClean="0">
-                <a:solidFill>
-                  <a:schemeClr val="tx1"/>
-                </a:solidFill>
-                <a:latin typeface="+mn-lt"/>
-                <a:ea typeface="+mn-ea"/>
-                <a:cs typeface="+mn-cs"/>
-              </a:rPr>
-              <a:t> good example of accessible site : </a:t>
-            </a:r>
-            <a:r>
-              <a:rPr lang="en-US" sz="1200" i="0" kern="1200" dirty="0" err="1" smtClean="0">
-                <a:solidFill>
-                  <a:schemeClr val="tx1"/>
-                </a:solidFill>
-                <a:latin typeface="+mn-lt"/>
-                <a:ea typeface="+mn-ea"/>
-                <a:cs typeface="+mn-cs"/>
-              </a:rPr>
-              <a:t>www.passport.gov.in</a:t>
-            </a:r>
-            <a:r>
-              <a:rPr lang="en-US" sz="1200" i="0" kern="1200" baseline="0" dirty="0" smtClean="0">
-                <a:solidFill>
-                  <a:schemeClr val="tx1"/>
-                </a:solidFill>
-                <a:latin typeface="+mn-lt"/>
-                <a:ea typeface="+mn-ea"/>
-                <a:cs typeface="+mn-cs"/>
-              </a:rPr>
-              <a:t>  and </a:t>
-            </a:r>
-            <a:r>
-              <a:rPr lang="en-US" sz="1200" i="0" kern="1200" baseline="0" dirty="0" err="1" smtClean="0">
-                <a:solidFill>
-                  <a:schemeClr val="tx1"/>
-                </a:solidFill>
-                <a:latin typeface="+mn-lt"/>
-                <a:ea typeface="+mn-ea"/>
-                <a:cs typeface="+mn-cs"/>
-              </a:rPr>
-              <a:t>www.usa.gov</a:t>
-            </a:r>
-            <a:endParaRPr lang="en-US" sz="1200" i="0" kern="1200" baseline="0" dirty="0" smtClean="0">
-              <a:solidFill>
-                <a:schemeClr val="tx1"/>
-              </a:solidFill>
-              <a:latin typeface="+mn-lt"/>
-              <a:ea typeface="+mn-ea"/>
-              <a:cs typeface="+mn-cs"/>
-            </a:endParaRPr>
-          </a:p>
-          <a:p>
-            <a:r>
-              <a:rPr lang="en-US" sz="1200" i="0" kern="1200" baseline="0" dirty="0" smtClean="0">
-                <a:solidFill>
-                  <a:schemeClr val="tx1"/>
-                </a:solidFill>
-                <a:latin typeface="+mn-lt"/>
-                <a:ea typeface="+mn-ea"/>
-                <a:cs typeface="+mn-cs"/>
-              </a:rPr>
-              <a:t>Example in the Guidelines 2 : 2.4.1</a:t>
-            </a:r>
-          </a:p>
-          <a:p>
-            <a:endParaRPr lang="en-US" sz="1200" i="0" kern="1200" baseline="0" dirty="0" smtClean="0">
-              <a:solidFill>
-                <a:schemeClr val="tx1"/>
-              </a:solidFill>
-              <a:latin typeface="+mn-lt"/>
-              <a:ea typeface="+mn-ea"/>
-              <a:cs typeface="+mn-cs"/>
-            </a:endParaRPr>
-          </a:p>
-          <a:p>
-            <a:r>
-              <a:rPr lang="en-US" sz="1200" i="0" kern="1200" baseline="0" dirty="0" smtClean="0">
-                <a:solidFill>
-                  <a:schemeClr val="tx1"/>
-                </a:solidFill>
-                <a:latin typeface="+mn-lt"/>
-                <a:ea typeface="+mn-ea"/>
-                <a:cs typeface="+mn-cs"/>
-              </a:rPr>
-              <a:t>2.4.2 </a:t>
-            </a:r>
-            <a:r>
-              <a:rPr lang="en-US" sz="1200" kern="1200" dirty="0" smtClean="0">
-                <a:solidFill>
-                  <a:schemeClr val="tx1"/>
-                </a:solidFill>
-                <a:latin typeface="+mn-lt"/>
-                <a:ea typeface="+mn-ea"/>
-                <a:cs typeface="+mn-cs"/>
-              </a:rPr>
-              <a:t>Titles identify the current location without requiring users to read or interpret page content. When titles appear in site maps or lists of search results, users can more quickly identify the content they need. Example : A banking application lets a user inspect his bank accounts, view past statements, and perform transactions. The Web application dynamically generates titles for each Web page, e.g., "Bank XYZ, accounts for John Smith" "Bank XYZ, December 2005 statement for Account 1234-5678".</a:t>
-            </a:r>
-          </a:p>
-          <a:p>
-            <a:endParaRPr lang="en-US" sz="1200" kern="1200" dirty="0" smtClean="0">
-              <a:solidFill>
-                <a:schemeClr val="tx1"/>
-              </a:solidFill>
-              <a:latin typeface="+mn-lt"/>
-              <a:ea typeface="+mn-ea"/>
-              <a:cs typeface="+mn-cs"/>
-            </a:endParaRPr>
-          </a:p>
-          <a:p>
-            <a:r>
-              <a:rPr lang="en-US" sz="1200" kern="1200" dirty="0" smtClean="0">
-                <a:solidFill>
-                  <a:schemeClr val="tx1"/>
-                </a:solidFill>
-                <a:latin typeface="+mn-lt"/>
-                <a:ea typeface="+mn-ea"/>
-                <a:cs typeface="+mn-cs"/>
-              </a:rPr>
-              <a:t>2.4.3 Example : A form contains two, side-by-side sections of information. One section contains information about an applicant; the other section contains information about the applicant's spouse. All the interactive elements in the applicant section receive focus before any of the elements in the spouse section. The elements in each section receive focus in the reading order of that section.</a:t>
-            </a:r>
-          </a:p>
-          <a:p>
-            <a:endParaRPr lang="en-US" sz="1200" i="0" kern="1200" dirty="0" smtClean="0">
-              <a:solidFill>
-                <a:schemeClr val="tx1"/>
-              </a:solidFill>
-              <a:latin typeface="+mn-lt"/>
-              <a:ea typeface="+mn-ea"/>
-              <a:cs typeface="+mn-cs"/>
-            </a:endParaRPr>
-          </a:p>
-          <a:p>
-            <a:r>
-              <a:rPr lang="en-US" sz="1200" i="0" kern="1200" dirty="0" smtClean="0">
-                <a:solidFill>
-                  <a:schemeClr val="tx1"/>
-                </a:solidFill>
-                <a:latin typeface="+mn-lt"/>
-                <a:ea typeface="+mn-ea"/>
-                <a:cs typeface="+mn-cs"/>
-              </a:rPr>
-              <a:t>2.4.4 </a:t>
-            </a:r>
-            <a:r>
-              <a:rPr lang="en-US" sz="1200" kern="1200" dirty="0" smtClean="0">
-                <a:solidFill>
-                  <a:schemeClr val="tx1"/>
-                </a:solidFill>
-                <a:latin typeface="+mn-lt"/>
-                <a:ea typeface="+mn-ea"/>
-                <a:cs typeface="+mn-cs"/>
-              </a:rPr>
-              <a:t>The objective of this technique is to describe the purpose of a link in the text of the link. The description lets a user distinguish this link from links in the Web page that lead to other destinations and helps the user determine whether to follow the link. The URI of the destination is generally not sufficiently descriptive.</a:t>
-            </a:r>
-          </a:p>
-          <a:p>
-            <a:r>
-              <a:rPr lang="en-US" sz="1200" i="0" kern="1200" dirty="0" smtClean="0">
-                <a:solidFill>
-                  <a:schemeClr val="tx1"/>
-                </a:solidFill>
-                <a:latin typeface="+mn-lt"/>
-                <a:ea typeface="+mn-ea"/>
-                <a:cs typeface="+mn-cs"/>
-              </a:rPr>
-              <a:t>Example : In the Guidelines</a:t>
-            </a:r>
-            <a:r>
-              <a:rPr lang="en-US" sz="1200" i="0" kern="1200" baseline="0" dirty="0" smtClean="0">
-                <a:solidFill>
-                  <a:schemeClr val="tx1"/>
-                </a:solidFill>
-                <a:latin typeface="+mn-lt"/>
-                <a:ea typeface="+mn-ea"/>
-                <a:cs typeface="+mn-cs"/>
-              </a:rPr>
-              <a:t> 2</a:t>
-            </a:r>
-            <a:endParaRPr lang="en-US" sz="1200" i="0" kern="1200" dirty="0" smtClean="0">
-              <a:solidFill>
-                <a:schemeClr val="tx1"/>
-              </a:solidFill>
-              <a:latin typeface="+mn-lt"/>
-              <a:ea typeface="+mn-ea"/>
-              <a:cs typeface="+mn-cs"/>
-            </a:endParaRPr>
-          </a:p>
-          <a:p>
-            <a:r>
-              <a:rPr lang="en-US" sz="1200" i="0" kern="1200" dirty="0" smtClean="0">
-                <a:solidFill>
-                  <a:schemeClr val="tx1"/>
-                </a:solidFill>
-                <a:latin typeface="+mn-lt"/>
-                <a:ea typeface="+mn-ea"/>
-                <a:cs typeface="+mn-cs"/>
-              </a:rPr>
-              <a:t>Failure Example</a:t>
-            </a:r>
-            <a:r>
-              <a:rPr lang="en-US" sz="1200" i="0" kern="1200" baseline="0" dirty="0" smtClean="0">
-                <a:solidFill>
-                  <a:schemeClr val="tx1"/>
-                </a:solidFill>
-                <a:latin typeface="+mn-lt"/>
-                <a:ea typeface="+mn-ea"/>
-                <a:cs typeface="+mn-cs"/>
-              </a:rPr>
-              <a:t> on website </a:t>
-            </a:r>
-            <a:r>
-              <a:rPr lang="en-US" sz="1200" i="0" kern="1200" baseline="0" dirty="0" err="1" smtClean="0">
-                <a:solidFill>
-                  <a:schemeClr val="tx1"/>
-                </a:solidFill>
-                <a:latin typeface="+mn-lt"/>
-                <a:ea typeface="+mn-ea"/>
-                <a:cs typeface="+mn-cs"/>
-              </a:rPr>
-              <a:t>www.ndtv.com</a:t>
-            </a:r>
-            <a:r>
-              <a:rPr lang="en-US" sz="1200" i="0" kern="1200" baseline="0" dirty="0" smtClean="0">
-                <a:solidFill>
-                  <a:schemeClr val="tx1"/>
-                </a:solidFill>
-                <a:latin typeface="+mn-lt"/>
-                <a:ea typeface="+mn-ea"/>
-                <a:cs typeface="+mn-cs"/>
-              </a:rPr>
-              <a:t> : Search for more text and under food section : More is ambiguous</a:t>
-            </a:r>
-            <a:endParaRPr lang="en-US" sz="1200" i="0" kern="1200" dirty="0" smtClean="0">
-              <a:solidFill>
-                <a:schemeClr val="tx1"/>
-              </a:solidFill>
-              <a:latin typeface="+mn-lt"/>
-              <a:ea typeface="+mn-ea"/>
-              <a:cs typeface="+mn-cs"/>
-            </a:endParaRPr>
+            <a:endParaRPr lang="en-US"/>
           </a:p>
         </p:txBody>
       </p:sp>
@@ -1592,7 +1276,7 @@
     </p:spTree>
     <p:extLst>
       <p:ext uri="{BB962C8B-B14F-4D97-AF65-F5344CB8AC3E}">
-        <p14:creationId xmlns:p14="http://schemas.microsoft.com/office/powerpoint/2010/main" val="3379108490"/>
+        <p14:creationId xmlns:p14="http://schemas.microsoft.com/office/powerpoint/2010/main" val="4190206285"/>
       </p:ext>
     </p:extLst>
   </p:cSld>
@@ -1646,7 +1330,323 @@
           <a:bodyPr/>
           <a:lstStyle/>
           <a:p>
-            <a:endParaRPr lang="en-US"/>
+            <a:r>
+              <a:rPr lang="en-US" dirty="0" smtClean="0"/>
+              <a:t>2.4.1 </a:t>
+            </a:r>
+            <a:r>
+              <a:rPr lang="en-US" dirty="0" err="1" smtClean="0"/>
+              <a:t>ByPass</a:t>
+            </a:r>
+            <a:r>
+              <a:rPr lang="en-US" baseline="0" dirty="0" smtClean="0"/>
+              <a:t> content : </a:t>
+            </a:r>
+            <a:r>
+              <a:rPr lang="en-US" sz="1200" i="1" kern="1200" dirty="0" smtClean="0">
+                <a:solidFill>
+                  <a:schemeClr val="tx1"/>
+                </a:solidFill>
+                <a:latin typeface="+mn-lt"/>
+                <a:ea typeface="+mn-ea"/>
+                <a:cs typeface="+mn-cs"/>
+              </a:rPr>
+              <a:t>Example 1: An online newspaper</a:t>
+            </a:r>
+          </a:p>
+          <a:p>
+            <a:r>
+              <a:rPr lang="en-US" sz="1200" i="0" kern="1200" dirty="0" smtClean="0">
+                <a:solidFill>
+                  <a:schemeClr val="tx1"/>
+                </a:solidFill>
+                <a:latin typeface="+mn-lt"/>
+                <a:ea typeface="+mn-ea"/>
+                <a:cs typeface="+mn-cs"/>
+              </a:rPr>
+              <a:t>An on-line newspaper contains many sections of information: a search function, a corporate banner, sidebars, minor stories, how to contact the newspaper, etc. The lead story is located in the middle of the page. The first link that the user reaches when tabbing through the page is titled "Skip to Lead Story". Activating the link moves visual focus to the story. Pressing tab again takes the user to the first link in the main story.</a:t>
+            </a:r>
+          </a:p>
+          <a:p>
+            <a:r>
+              <a:rPr lang="en-US" sz="1200" i="1" kern="1200" dirty="0" smtClean="0">
+                <a:solidFill>
+                  <a:schemeClr val="tx1"/>
+                </a:solidFill>
+                <a:latin typeface="+mn-lt"/>
+                <a:ea typeface="+mn-ea"/>
+                <a:cs typeface="+mn-cs"/>
+              </a:rPr>
+              <a:t>Example 2: A "Skip to main content" link</a:t>
+            </a:r>
+          </a:p>
+          <a:p>
+            <a:r>
+              <a:rPr lang="en-US" sz="1200" i="0" kern="1200" dirty="0" smtClean="0">
+                <a:solidFill>
+                  <a:schemeClr val="tx1"/>
+                </a:solidFill>
+                <a:latin typeface="+mn-lt"/>
+                <a:ea typeface="+mn-ea"/>
+                <a:cs typeface="+mn-cs"/>
+              </a:rPr>
+              <a:t>A Web page includes a variety of navigation techniques on each page: a bread crumb trail, a search tool, a site map, and a list of related resources. The first link on the page is titled "Skip to Main Content". A user activates the link to skip over the navigation tools. </a:t>
+            </a:r>
+          </a:p>
+          <a:p>
+            <a:r>
+              <a:rPr lang="en-US" sz="1200" i="0" kern="1200" dirty="0" smtClean="0">
+                <a:solidFill>
+                  <a:schemeClr val="tx1"/>
+                </a:solidFill>
+                <a:latin typeface="+mn-lt"/>
+                <a:ea typeface="+mn-ea"/>
+                <a:cs typeface="+mn-cs"/>
+              </a:rPr>
+              <a:t>A very</a:t>
+            </a:r>
+            <a:r>
+              <a:rPr lang="en-US" sz="1200" i="0" kern="1200" baseline="0" dirty="0" smtClean="0">
+                <a:solidFill>
+                  <a:schemeClr val="tx1"/>
+                </a:solidFill>
+                <a:latin typeface="+mn-lt"/>
+                <a:ea typeface="+mn-ea"/>
+                <a:cs typeface="+mn-cs"/>
+              </a:rPr>
+              <a:t> good example of accessible site : </a:t>
+            </a:r>
+            <a:r>
+              <a:rPr lang="en-US" sz="1200" i="0" kern="1200" dirty="0" err="1" smtClean="0">
+                <a:solidFill>
+                  <a:schemeClr val="tx1"/>
+                </a:solidFill>
+                <a:latin typeface="+mn-lt"/>
+                <a:ea typeface="+mn-ea"/>
+                <a:cs typeface="+mn-cs"/>
+              </a:rPr>
+              <a:t>www.passport.gov.in</a:t>
+            </a:r>
+            <a:r>
+              <a:rPr lang="en-US" sz="1200" i="0" kern="1200" baseline="0" dirty="0" smtClean="0">
+                <a:solidFill>
+                  <a:schemeClr val="tx1"/>
+                </a:solidFill>
+                <a:latin typeface="+mn-lt"/>
+                <a:ea typeface="+mn-ea"/>
+                <a:cs typeface="+mn-cs"/>
+              </a:rPr>
+              <a:t>  and </a:t>
+            </a:r>
+            <a:r>
+              <a:rPr lang="en-US" sz="1200" i="0" kern="1200" baseline="0" dirty="0" err="1" smtClean="0">
+                <a:solidFill>
+                  <a:schemeClr val="tx1"/>
+                </a:solidFill>
+                <a:latin typeface="+mn-lt"/>
+                <a:ea typeface="+mn-ea"/>
+                <a:cs typeface="+mn-cs"/>
+              </a:rPr>
+              <a:t>www.usa.gov</a:t>
+            </a:r>
+            <a:endParaRPr lang="en-US" sz="1200" i="0" kern="1200" baseline="0" dirty="0" smtClean="0">
+              <a:solidFill>
+                <a:schemeClr val="tx1"/>
+              </a:solidFill>
+              <a:latin typeface="+mn-lt"/>
+              <a:ea typeface="+mn-ea"/>
+              <a:cs typeface="+mn-cs"/>
+            </a:endParaRPr>
+          </a:p>
+          <a:p>
+            <a:r>
+              <a:rPr lang="en-US" sz="1200" i="0" kern="1200" baseline="0" dirty="0" smtClean="0">
+                <a:solidFill>
+                  <a:schemeClr val="tx1"/>
+                </a:solidFill>
+                <a:latin typeface="+mn-lt"/>
+                <a:ea typeface="+mn-ea"/>
+                <a:cs typeface="+mn-cs"/>
+              </a:rPr>
+              <a:t>Example in the Guidelines 2 : 2.4.1</a:t>
+            </a:r>
+          </a:p>
+          <a:p>
+            <a:endParaRPr lang="en-US" sz="1200" i="0" kern="1200" baseline="0" dirty="0" smtClean="0">
+              <a:solidFill>
+                <a:schemeClr val="tx1"/>
+              </a:solidFill>
+              <a:latin typeface="+mn-lt"/>
+              <a:ea typeface="+mn-ea"/>
+              <a:cs typeface="+mn-cs"/>
+            </a:endParaRPr>
+          </a:p>
+          <a:p>
+            <a:r>
+              <a:rPr lang="en-US" sz="1200" i="0" kern="1200" baseline="0" dirty="0" smtClean="0">
+                <a:solidFill>
+                  <a:schemeClr val="tx1"/>
+                </a:solidFill>
+                <a:latin typeface="+mn-lt"/>
+                <a:ea typeface="+mn-ea"/>
+                <a:cs typeface="+mn-cs"/>
+              </a:rPr>
+              <a:t>2.4.2 </a:t>
+            </a:r>
+            <a:r>
+              <a:rPr lang="en-US" sz="1200" kern="1200" dirty="0" smtClean="0">
+                <a:solidFill>
+                  <a:schemeClr val="tx1"/>
+                </a:solidFill>
+                <a:latin typeface="+mn-lt"/>
+                <a:ea typeface="+mn-ea"/>
+                <a:cs typeface="+mn-cs"/>
+              </a:rPr>
+              <a:t>Titles identify the current location without requiring users to read or interpret page content. When titles appear in site maps or lists of search results, users can more quickly identify the content they need. Example : A banking application lets a user inspect his bank accounts, view past statements, and perform transactions. The Web application dynamically generates titles for each Web page, e.g., "Bank XYZ, accounts for John Smith" "Bank XYZ, December 2005 statement for Account 1234-5678".</a:t>
+            </a:r>
+          </a:p>
+          <a:p>
+            <a:endParaRPr lang="en-US" sz="1200" kern="1200" dirty="0" smtClean="0">
+              <a:solidFill>
+                <a:schemeClr val="tx1"/>
+              </a:solidFill>
+              <a:latin typeface="+mn-lt"/>
+              <a:ea typeface="+mn-ea"/>
+              <a:cs typeface="+mn-cs"/>
+            </a:endParaRPr>
+          </a:p>
+          <a:p>
+            <a:r>
+              <a:rPr lang="en-US" sz="1200" kern="1200" dirty="0" smtClean="0">
+                <a:solidFill>
+                  <a:schemeClr val="tx1"/>
+                </a:solidFill>
+                <a:latin typeface="+mn-lt"/>
+                <a:ea typeface="+mn-ea"/>
+                <a:cs typeface="+mn-cs"/>
+              </a:rPr>
+              <a:t>2.4.3 Example : A form contains two, side-by-side sections of information. One section contains information about an applicant; the other section contains information about the applicant's spouse. All the interactive elements in the applicant section receive focus before any of the elements in the spouse section. The elements in each section receive focus in the reading order of that section.</a:t>
+            </a:r>
+          </a:p>
+          <a:p>
+            <a:endParaRPr lang="en-US" sz="1200" i="0" kern="1200" dirty="0" smtClean="0">
+              <a:solidFill>
+                <a:schemeClr val="tx1"/>
+              </a:solidFill>
+              <a:latin typeface="+mn-lt"/>
+              <a:ea typeface="+mn-ea"/>
+              <a:cs typeface="+mn-cs"/>
+            </a:endParaRPr>
+          </a:p>
+          <a:p>
+            <a:r>
+              <a:rPr lang="en-US" sz="1200" i="0" kern="1200" dirty="0" smtClean="0">
+                <a:solidFill>
+                  <a:schemeClr val="tx1"/>
+                </a:solidFill>
+                <a:latin typeface="+mn-lt"/>
+                <a:ea typeface="+mn-ea"/>
+                <a:cs typeface="+mn-cs"/>
+              </a:rPr>
+              <a:t>2.4.4 </a:t>
+            </a:r>
+            <a:r>
+              <a:rPr lang="en-US" sz="1200" kern="1200" dirty="0" smtClean="0">
+                <a:solidFill>
+                  <a:schemeClr val="tx1"/>
+                </a:solidFill>
+                <a:latin typeface="+mn-lt"/>
+                <a:ea typeface="+mn-ea"/>
+                <a:cs typeface="+mn-cs"/>
+              </a:rPr>
+              <a:t>The objective of this technique is to describe the purpose of a link in the text of the link. The description lets a user distinguish this link from links in the Web page that lead to other destinations and helps the user determine whether to follow the link. The URI of the destination is generally not sufficiently descriptive.</a:t>
+            </a:r>
+          </a:p>
+          <a:p>
+            <a:r>
+              <a:rPr lang="en-US" sz="1200" i="0" kern="1200" dirty="0" smtClean="0">
+                <a:solidFill>
+                  <a:schemeClr val="tx1"/>
+                </a:solidFill>
+                <a:latin typeface="+mn-lt"/>
+                <a:ea typeface="+mn-ea"/>
+                <a:cs typeface="+mn-cs"/>
+              </a:rPr>
+              <a:t>Example : In the Guidelines</a:t>
+            </a:r>
+            <a:r>
+              <a:rPr lang="en-US" sz="1200" i="0" kern="1200" baseline="0" dirty="0" smtClean="0">
+                <a:solidFill>
+                  <a:schemeClr val="tx1"/>
+                </a:solidFill>
+                <a:latin typeface="+mn-lt"/>
+                <a:ea typeface="+mn-ea"/>
+                <a:cs typeface="+mn-cs"/>
+              </a:rPr>
+              <a:t> 2</a:t>
+            </a:r>
+            <a:endParaRPr lang="en-US" sz="1200" i="0" kern="1200" dirty="0" smtClean="0">
+              <a:solidFill>
+                <a:schemeClr val="tx1"/>
+              </a:solidFill>
+              <a:latin typeface="+mn-lt"/>
+              <a:ea typeface="+mn-ea"/>
+              <a:cs typeface="+mn-cs"/>
+            </a:endParaRPr>
+          </a:p>
+          <a:p>
+            <a:r>
+              <a:rPr lang="en-US" sz="1200" i="0" kern="1200" dirty="0" smtClean="0">
+                <a:solidFill>
+                  <a:schemeClr val="tx1"/>
+                </a:solidFill>
+                <a:latin typeface="+mn-lt"/>
+                <a:ea typeface="+mn-ea"/>
+                <a:cs typeface="+mn-cs"/>
+              </a:rPr>
+              <a:t>Failure Example</a:t>
+            </a:r>
+            <a:r>
+              <a:rPr lang="en-US" sz="1200" i="0" kern="1200" baseline="0" dirty="0" smtClean="0">
+                <a:solidFill>
+                  <a:schemeClr val="tx1"/>
+                </a:solidFill>
+                <a:latin typeface="+mn-lt"/>
+                <a:ea typeface="+mn-ea"/>
+                <a:cs typeface="+mn-cs"/>
+              </a:rPr>
+              <a:t> on website </a:t>
+            </a:r>
+            <a:r>
+              <a:rPr lang="en-US" sz="1200" i="0" kern="1200" baseline="0" dirty="0" err="1" smtClean="0">
+                <a:solidFill>
+                  <a:schemeClr val="tx1"/>
+                </a:solidFill>
+                <a:latin typeface="+mn-lt"/>
+                <a:ea typeface="+mn-ea"/>
+                <a:cs typeface="+mn-cs"/>
+              </a:rPr>
+              <a:t>www.ndtv.com</a:t>
+            </a:r>
+            <a:r>
+              <a:rPr lang="en-US" sz="1200" i="0" kern="1200" baseline="0" dirty="0" smtClean="0">
+                <a:solidFill>
+                  <a:schemeClr val="tx1"/>
+                </a:solidFill>
+                <a:latin typeface="+mn-lt"/>
+                <a:ea typeface="+mn-ea"/>
+                <a:cs typeface="+mn-cs"/>
+              </a:rPr>
+              <a:t> : Search for more text and under food section : More is ambiguous</a:t>
+            </a:r>
+            <a:endParaRPr lang="en-US" sz="1200" i="0" kern="1200" dirty="0" smtClean="0">
+              <a:solidFill>
+                <a:schemeClr val="tx1"/>
+              </a:solidFill>
+              <a:latin typeface="+mn-lt"/>
+              <a:ea typeface="+mn-ea"/>
+              <a:cs typeface="+mn-cs"/>
+            </a:endParaRPr>
           </a:p>
         </p:txBody>
       </p:sp>
@@ -1677,7 +1677,7 @@
     </p:spTree>
     <p:extLst>
       <p:ext uri="{BB962C8B-B14F-4D97-AF65-F5344CB8AC3E}">
-        <p14:creationId xmlns:p14="http://schemas.microsoft.com/office/powerpoint/2010/main" val="4190206285"/>
+        <p14:creationId xmlns:p14="http://schemas.microsoft.com/office/powerpoint/2010/main" val="3379108490"/>
       </p:ext>
     </p:extLst>
   </p:cSld>
@@ -5666,15 +5666,7 @@
           <a:p>
             <a:r>
               <a:rPr lang="en-US" dirty="0" smtClean="0"/>
-              <a:t>Guideline </a:t>
-            </a:r>
-            <a:r>
-              <a:rPr lang="en-US" dirty="0" smtClean="0"/>
-              <a:t>2 </a:t>
-            </a:r>
-            <a:r>
-              <a:rPr lang="en-US" dirty="0" smtClean="0"/>
-              <a:t>for    </a:t>
+              <a:t>Guideline 2 for    </a:t>
             </a:r>
             <a:br>
               <a:rPr lang="en-US" dirty="0" smtClean="0"/>
@@ -5682,10 +5674,6 @@
             <a:r>
               <a:rPr lang="en-US" dirty="0" smtClean="0"/>
               <a:t>operable</a:t>
-            </a:r>
-            <a:r>
-              <a:rPr lang="en-US" dirty="0" smtClean="0"/>
-              <a:t/>
             </a:r>
             <a:br>
               <a:rPr lang="en-US" dirty="0" smtClean="0"/>
@@ -6232,7 +6220,7 @@
         <p:spPr/>
         <p:txBody>
           <a:bodyPr>
-            <a:normAutofit fontScale="92500"/>
+            <a:normAutofit/>
           </a:bodyPr>
           <a:lstStyle/>
           <a:p>
@@ -6276,9 +6264,14 @@
               <a:t>interfere with reading </a:t>
             </a:r>
             <a:r>
+              <a:rPr lang="en-US" dirty="0"/>
+              <a:t>content, Moving content can be paused and </a:t>
+            </a:r>
+            <a:r>
               <a:rPr lang="en-US" dirty="0" smtClean="0"/>
-              <a:t>content</a:t>
-            </a:r>
+              <a:t>restarted</a:t>
+            </a:r>
+            <a:endParaRPr lang="en-US" dirty="0" smtClean="0"/>
           </a:p>
           <a:p>
             <a:pPr>
@@ -6287,14 +6280,13 @@
               </a:lnSpc>
             </a:pPr>
             <a:r>
-              <a:rPr lang="en-US" dirty="0">
-                <a:latin typeface="Calibri" charset="0"/>
-              </a:rPr>
-              <a:t>Timing is not essential to understanding meaning </a:t>
-            </a:r>
-            <a:endParaRPr lang="en-US" dirty="0" smtClean="0">
-              <a:latin typeface="Calibri" charset="0"/>
-            </a:endParaRPr>
+              <a:rPr lang="en-US" dirty="0" smtClean="0"/>
+              <a:t>Auto-refresh </a:t>
+            </a:r>
+            <a:r>
+              <a:rPr lang="en-US" dirty="0"/>
+              <a:t>and other interruptions can be suppressed by a user</a:t>
+            </a:r>
           </a:p>
           <a:p>
             <a:pPr>
@@ -6303,34 +6295,12 @@
               </a:lnSpc>
             </a:pPr>
             <a:r>
+              <a:rPr lang="en-US" dirty="0"/>
+              <a:t>Re-authentication after time-out does not lose </a:t>
+            </a:r>
+            <a:r>
               <a:rPr lang="en-US" dirty="0" smtClean="0"/>
-              <a:t>Moving </a:t>
-            </a:r>
-            <a:r>
-              <a:rPr lang="en-US" dirty="0"/>
-              <a:t>content can be paused and restarted</a:t>
-            </a:r>
-          </a:p>
-          <a:p>
-            <a:pPr>
-              <a:lnSpc>
-                <a:spcPct val="90000"/>
-              </a:lnSpc>
-            </a:pPr>
-            <a:r>
-              <a:rPr lang="en-US" dirty="0"/>
-              <a:t>Auto-refresh and other interruptions can be suppressed by a user</a:t>
-            </a:r>
-          </a:p>
-          <a:p>
-            <a:pPr>
-              <a:lnSpc>
-                <a:spcPct val="90000"/>
-              </a:lnSpc>
-            </a:pPr>
-            <a:r>
-              <a:rPr lang="en-US" dirty="0"/>
-              <a:t>Re-authentication after time-out does not lose data</a:t>
+              <a:t>data (AAA)</a:t>
             </a:r>
             <a:endParaRPr lang="en-US" sz="2800" dirty="0"/>
           </a:p>
@@ -6416,14 +6386,19 @@
         <p:spPr/>
         <p:txBody>
           <a:bodyPr>
-            <a:noAutofit/>
+            <a:normAutofit fontScale="90000"/>
           </a:bodyPr>
           <a:lstStyle/>
           <a:p>
             <a:r>
-              <a:rPr lang="en-US" sz="3600" dirty="0"/>
-              <a:t>Guideline 2.4: Help users with disabilities navigate, find content and determine where they are</a:t>
-            </a:r>
+              <a:rPr lang="en-US" dirty="0"/>
+              <a:t>Guideline 2.3: Do not create content that is known to cause </a:t>
+            </a:r>
+            <a:r>
+              <a:rPr lang="en-US" dirty="0" smtClean="0"/>
+              <a:t>seizures</a:t>
+            </a:r>
+            <a:endParaRPr lang="en-US" dirty="0"/>
           </a:p>
         </p:txBody>
       </p:sp>
@@ -6437,61 +6412,78 @@
             <p:ph idx="1"/>
           </p:nvPr>
         </p:nvSpPr>
-        <p:spPr>
-          <a:xfrm>
-            <a:off x="762000" y="1752600"/>
-            <a:ext cx="8077200" cy="4297363"/>
-          </a:xfrm>
-        </p:spPr>
-        <p:txBody>
-          <a:bodyPr/>
+        <p:spPr/>
+        <p:txBody>
+          <a:bodyPr>
+            <a:normAutofit lnSpcReduction="10000"/>
+          </a:bodyPr>
           <a:lstStyle/>
           <a:p>
             <a:pPr>
-              <a:lnSpc>
-                <a:spcPct val="90000"/>
-              </a:lnSpc>
+              <a:buFontTx/>
+              <a:buNone/>
             </a:pPr>
             <a:r>
               <a:rPr lang="en-US" dirty="0"/>
-              <a:t>Provide a way to bypass content repeated on multiple pages</a:t>
+              <a:t>Some content that flashes more than 3</a:t>
             </a:r>
           </a:p>
           <a:p>
             <a:pPr>
-              <a:lnSpc>
-                <a:spcPct val="90000"/>
-              </a:lnSpc>
+              <a:buFontTx/>
+              <a:buNone/>
             </a:pPr>
             <a:r>
               <a:rPr lang="en-US" dirty="0"/>
-              <a:t>Pages should have descriptive titles</a:t>
-            </a:r>
+              <a:t>times in one second may cause seizures.</a:t>
+            </a:r>
+          </a:p>
+          <a:p>
+            <a:r>
+              <a:rPr lang="en-US" dirty="0" smtClean="0"/>
+              <a:t>Example : </a:t>
+            </a:r>
+            <a:r>
+              <a:rPr lang="en-US" dirty="0" smtClean="0">
+                <a:hlinkClick r:id="rId3"/>
+              </a:rPr>
+              <a:t>www.mono-1.com/monoface/main.html</a:t>
+            </a:r>
+            <a:endParaRPr lang="en-US" dirty="0" smtClean="0"/>
+          </a:p>
+          <a:p>
+            <a:endParaRPr lang="en-US" dirty="0"/>
           </a:p>
           <a:p>
             <a:pPr>
-              <a:lnSpc>
-                <a:spcPct val="90000"/>
-              </a:lnSpc>
+              <a:buFontTx/>
+              <a:buNone/>
             </a:pPr>
             <a:r>
               <a:rPr lang="en-US" dirty="0"/>
-              <a:t>Sequential navigation should show relationships and information through presentation</a:t>
+              <a:t>Free download Photosensitivity Epilepsy</a:t>
             </a:r>
           </a:p>
           <a:p>
             <a:pPr>
-              <a:lnSpc>
-                <a:spcPct val="90000"/>
-              </a:lnSpc>
+              <a:buFontTx/>
+              <a:buNone/>
             </a:pPr>
             <a:r>
               <a:rPr lang="en-US" dirty="0"/>
-              <a:t>The purpose of a link is understood by text and </a:t>
-            </a:r>
-            <a:r>
-              <a:rPr lang="en-US" dirty="0" smtClean="0"/>
-              <a:t>context.</a:t>
+              <a:t>Analysis Tool at </a:t>
+            </a:r>
+          </a:p>
+          <a:p>
+            <a:pPr>
+              <a:buFontTx/>
+              <a:buNone/>
+            </a:pPr>
+            <a:r>
+              <a:rPr lang="en-US" dirty="0">
+                <a:hlinkClick r:id="rId4"/>
+              </a:rPr>
+              <a:t>http://trace.wisc.edu/peat/</a:t>
             </a:r>
             <a:endParaRPr lang="en-US" dirty="0"/>
           </a:p>
@@ -6527,7 +6519,7 @@
     </p:spTree>
     <p:extLst>
       <p:ext uri="{BB962C8B-B14F-4D97-AF65-F5344CB8AC3E}">
-        <p14:creationId xmlns:p14="http://schemas.microsoft.com/office/powerpoint/2010/main" val="4072318638"/>
+        <p14:creationId xmlns:p14="http://schemas.microsoft.com/office/powerpoint/2010/main" val="3955229751"/>
       </p:ext>
     </p:extLst>
   </p:cSld>
@@ -6577,104 +6569,82 @@
         <p:spPr/>
         <p:txBody>
           <a:bodyPr>
-            <a:normAutofit fontScale="90000"/>
+            <a:noAutofit/>
           </a:bodyPr>
           <a:lstStyle/>
           <a:p>
             <a:r>
+              <a:rPr lang="en-US" sz="3600" dirty="0"/>
+              <a:t>Guideline 2.4: Help users with disabilities navigate, find content and determine where they are</a:t>
+            </a:r>
+          </a:p>
+        </p:txBody>
+      </p:sp>
+      <p:sp>
+        <p:nvSpPr>
+          <p:cNvPr id="3" name="Content Placeholder 2"/>
+          <p:cNvSpPr>
+            <a:spLocks noGrp="1"/>
+          </p:cNvSpPr>
+          <p:nvPr>
+            <p:ph idx="1"/>
+          </p:nvPr>
+        </p:nvSpPr>
+        <p:spPr>
+          <a:xfrm>
+            <a:off x="762000" y="1752600"/>
+            <a:ext cx="8077200" cy="4297363"/>
+          </a:xfrm>
+        </p:spPr>
+        <p:txBody>
+          <a:bodyPr/>
+          <a:lstStyle/>
+          <a:p>
+            <a:pPr>
+              <a:lnSpc>
+                <a:spcPct val="90000"/>
+              </a:lnSpc>
+            </a:pPr>
+            <a:r>
               <a:rPr lang="en-US" dirty="0"/>
-              <a:t>Guideline 2.3: Do not create content that is known to cause </a:t>
+              <a:t>Provide a way to bypass content repeated on multiple pages</a:t>
+            </a:r>
+          </a:p>
+          <a:p>
+            <a:pPr>
+              <a:lnSpc>
+                <a:spcPct val="90000"/>
+              </a:lnSpc>
+            </a:pPr>
+            <a:r>
+              <a:rPr lang="en-US" dirty="0"/>
+              <a:t>Pages should have descriptive titles</a:t>
+            </a:r>
+          </a:p>
+          <a:p>
+            <a:pPr>
+              <a:lnSpc>
+                <a:spcPct val="90000"/>
+              </a:lnSpc>
+            </a:pPr>
+            <a:r>
+              <a:rPr lang="en-US" dirty="0"/>
+              <a:t>Sequential navigation should show relationships and information through presentation</a:t>
+            </a:r>
+          </a:p>
+          <a:p>
+            <a:pPr>
+              <a:lnSpc>
+                <a:spcPct val="90000"/>
+              </a:lnSpc>
+            </a:pPr>
+            <a:r>
+              <a:rPr lang="en-US" dirty="0"/>
+              <a:t>The purpose of a link is understood by text and </a:t>
             </a:r>
             <a:r>
               <a:rPr lang="en-US" dirty="0" smtClean="0"/>
-              <a:t>seizures</a:t>
-            </a:r>
-            <a:endParaRPr lang="en-US" dirty="0"/>
-          </a:p>
-        </p:txBody>
-      </p:sp>
-      <p:sp>
-        <p:nvSpPr>
-          <p:cNvPr id="3" name="Content Placeholder 2"/>
-          <p:cNvSpPr>
-            <a:spLocks noGrp="1"/>
-          </p:cNvSpPr>
-          <p:nvPr>
-            <p:ph idx="1"/>
-          </p:nvPr>
-        </p:nvSpPr>
-        <p:spPr/>
-        <p:txBody>
-          <a:bodyPr>
-            <a:normAutofit lnSpcReduction="10000"/>
-          </a:bodyPr>
-          <a:lstStyle/>
-          <a:p>
-            <a:pPr>
-              <a:buFontTx/>
-              <a:buNone/>
-            </a:pPr>
-            <a:r>
-              <a:rPr lang="en-US" dirty="0"/>
-              <a:t>Some content that flashes more than 3</a:t>
-            </a:r>
-          </a:p>
-          <a:p>
-            <a:pPr>
-              <a:buFontTx/>
-              <a:buNone/>
-            </a:pPr>
-            <a:r>
-              <a:rPr lang="en-US" dirty="0"/>
-              <a:t>times in one second may cause seizures.</a:t>
-            </a:r>
-          </a:p>
-          <a:p>
-            <a:r>
-              <a:rPr lang="en-US" dirty="0" smtClean="0"/>
-              <a:t>Example : </a:t>
-            </a:r>
-            <a:r>
-              <a:rPr lang="en-US" dirty="0" smtClean="0">
-                <a:hlinkClick r:id="rId3"/>
-              </a:rPr>
-              <a:t>www.mono-1.com/monoface/main.html</a:t>
-            </a:r>
-            <a:endParaRPr lang="en-US" dirty="0" smtClean="0"/>
-          </a:p>
-          <a:p>
-            <a:endParaRPr lang="en-US" dirty="0"/>
-          </a:p>
-          <a:p>
-            <a:pPr>
-              <a:buFontTx/>
-              <a:buNone/>
-            </a:pPr>
-            <a:r>
-              <a:rPr lang="en-US" dirty="0"/>
-              <a:t>Free download Photosensitivity Epilepsy</a:t>
-            </a:r>
-          </a:p>
-          <a:p>
-            <a:pPr>
-              <a:buFontTx/>
-              <a:buNone/>
-            </a:pPr>
-            <a:r>
-              <a:rPr lang="en-US" dirty="0"/>
-              <a:t>Analysis Tool at </a:t>
-            </a:r>
-          </a:p>
-          <a:p>
-            <a:pPr>
-              <a:buFontTx/>
-              <a:buNone/>
-            </a:pPr>
-            <a:r>
-              <a:rPr lang="en-US" dirty="0">
-                <a:hlinkClick r:id="rId4"/>
-              </a:rPr>
-              <a:t>http://trace.wisc.edu/peat/</a:t>
+              <a:t>context.</a:t>
             </a:r>
             <a:endParaRPr lang="en-US" dirty="0"/>
           </a:p>
@@ -6710,7 +6680,7 @@
     </p:spTree>
     <p:extLst>
       <p:ext uri="{BB962C8B-B14F-4D97-AF65-F5344CB8AC3E}">
-        <p14:creationId xmlns:p14="http://schemas.microsoft.com/office/powerpoint/2010/main" val="3955229751"/>
+        <p14:creationId xmlns:p14="http://schemas.microsoft.com/office/powerpoint/2010/main" val="4072318638"/>
       </p:ext>
     </p:extLst>
   </p:cSld>

</xml_diff>